<commit_message>
Added a new experiment. Updated the slides to include experimental results. Improved the structure of they python files.
</commit_message>
<xml_diff>
--- a/IGW.pptx
+++ b/IGW.pptx
@@ -18,6 +18,9 @@
     <p:sldId id="263" r:id="rId13"/>
     <p:sldId id="264" r:id="rId14"/>
     <p:sldId id="265" r:id="rId15"/>
+    <p:sldId id="266" r:id="rId16"/>
+    <p:sldId id="267" r:id="rId17"/>
+    <p:sldId id="268" r:id="rId18"/>
   </p:sldIdLst>
   <p:sldSz cy="5143500" cx="9144000"/>
   <p:notesSz cx="6858000" cy="9144000"/>
@@ -799,7 +802,7 @@
   <p:cSld>
     <p:spTree>
       <p:nvGrpSpPr>
-        <p:cNvPr id="115" name="Shape 115"/>
+        <p:cNvPr id="120" name="Shape 120"/>
         <p:cNvGrpSpPr/>
         <p:nvPr/>
       </p:nvGrpSpPr>
@@ -813,7 +816,7 @@
       </p:grpSpPr>
       <p:sp>
         <p:nvSpPr>
-          <p:cNvPr id="116" name="Google Shape;116;g25480cdd8c2_0_28:notes"/>
+          <p:cNvPr id="121" name="Google Shape;121;g25480cdd8c2_0_28:notes"/>
           <p:cNvSpPr/>
           <p:nvPr>
             <p:ph idx="2" type="sldImg"/>
@@ -848,7 +851,304 @@
       </p:sp>
       <p:sp>
         <p:nvSpPr>
-          <p:cNvPr id="117" name="Google Shape;117;g25480cdd8c2_0_28:notes"/>
+          <p:cNvPr id="122" name="Google Shape;122;g25480cdd8c2_0_28:notes"/>
+          <p:cNvSpPr txBox="1"/>
+          <p:nvPr>
+            <p:ph idx="1" type="body"/>
+          </p:nvPr>
+        </p:nvSpPr>
+        <p:spPr>
+          <a:xfrm>
+            <a:off x="685800" y="4343400"/>
+            <a:ext cx="5486400" cy="4114800"/>
+          </a:xfrm>
+          <a:prstGeom prst="rect">
+            <a:avLst/>
+          </a:prstGeom>
+        </p:spPr>
+        <p:txBody>
+          <a:bodyPr anchorCtr="0" anchor="t" bIns="91425" lIns="91425" spcFirstLastPara="1" rIns="91425" wrap="square" tIns="91425">
+            <a:noAutofit/>
+          </a:bodyPr>
+          <a:lstStyle/>
+          <a:p>
+            <a:pPr indent="0" lvl="0" marL="0" rtl="0" algn="l">
+              <a:spcBef>
+                <a:spcPts val="0"/>
+              </a:spcBef>
+              <a:spcAft>
+                <a:spcPts val="0"/>
+              </a:spcAft>
+              <a:buNone/>
+            </a:pPr>
+            <a:r>
+              <a:t/>
+            </a:r>
+            <a:endParaRPr/>
+          </a:p>
+        </p:txBody>
+      </p:sp>
+    </p:spTree>
+  </p:cSld>
+  <p:clrMapOvr>
+    <a:masterClrMapping/>
+  </p:clrMapOvr>
+</p:notes>
+</file>
+
+<file path=ppt/notesSlides/notesSlide11.xml><?xml version="1.0" encoding="utf-8"?>
+<p:notes xmlns:a="http://schemas.openxmlformats.org/drawingml/2006/main" xmlns:r="http://schemas.openxmlformats.org/officeDocument/2006/relationships" xmlns:mc="http://schemas.openxmlformats.org/markup-compatibility/2006" xmlns:mv="urn:schemas-microsoft-com:mac:vml" xmlns:p="http://schemas.openxmlformats.org/presentationml/2006/main" xmlns:c="http://schemas.openxmlformats.org/drawingml/2006/chart" xmlns:dgm="http://schemas.openxmlformats.org/drawingml/2006/diagram" xmlns:o="urn:schemas-microsoft-com:office:office" xmlns:v="urn:schemas-microsoft-com:vml" xmlns:pvml="urn:schemas-microsoft-com:office:powerpoint" xmlns:com="http://schemas.openxmlformats.org/drawingml/2006/compatibility" xmlns:p14="http://schemas.microsoft.com/office/powerpoint/2010/main" xmlns:p15="http://schemas.microsoft.com/office/powerpoint/2012/main" xmlns:ahyp="http://schemas.microsoft.com/office/drawing/2018/hyperlinkcolor" showMasterPhAnim="0" showMasterSp="0">
+  <p:cSld>
+    <p:spTree>
+      <p:nvGrpSpPr>
+        <p:cNvPr id="126" name="Shape 126"/>
+        <p:cNvGrpSpPr/>
+        <p:nvPr/>
+      </p:nvGrpSpPr>
+      <p:grpSpPr>
+        <a:xfrm>
+          <a:off x="0" y="0"/>
+          <a:ext cx="0" cy="0"/>
+          <a:chOff x="0" y="0"/>
+          <a:chExt cx="0" cy="0"/>
+        </a:xfrm>
+      </p:grpSpPr>
+      <p:sp>
+        <p:nvSpPr>
+          <p:cNvPr id="127" name="Google Shape;127;g25779a769d4_0_0:notes"/>
+          <p:cNvSpPr/>
+          <p:nvPr>
+            <p:ph idx="2" type="sldImg"/>
+          </p:nvPr>
+        </p:nvSpPr>
+        <p:spPr>
+          <a:xfrm>
+            <a:off x="381300" y="685800"/>
+            <a:ext cx="6096000" cy="3429000"/>
+          </a:xfrm>
+          <a:custGeom>
+            <a:rect b="b" l="l" r="r" t="t"/>
+            <a:pathLst>
+              <a:path extrusionOk="0" h="120000" w="120000">
+                <a:moveTo>
+                  <a:pt x="0" y="0"/>
+                </a:moveTo>
+                <a:lnTo>
+                  <a:pt x="120000" y="0"/>
+                </a:lnTo>
+                <a:lnTo>
+                  <a:pt x="120000" y="120000"/>
+                </a:lnTo>
+                <a:lnTo>
+                  <a:pt x="0" y="120000"/>
+                </a:lnTo>
+                <a:close/>
+              </a:path>
+            </a:pathLst>
+          </a:custGeom>
+        </p:spPr>
+      </p:sp>
+      <p:sp>
+        <p:nvSpPr>
+          <p:cNvPr id="128" name="Google Shape;128;g25779a769d4_0_0:notes"/>
+          <p:cNvSpPr txBox="1"/>
+          <p:nvPr>
+            <p:ph idx="1" type="body"/>
+          </p:nvPr>
+        </p:nvSpPr>
+        <p:spPr>
+          <a:xfrm>
+            <a:off x="685800" y="4343400"/>
+            <a:ext cx="5486400" cy="4114800"/>
+          </a:xfrm>
+          <a:prstGeom prst="rect">
+            <a:avLst/>
+          </a:prstGeom>
+        </p:spPr>
+        <p:txBody>
+          <a:bodyPr anchorCtr="0" anchor="t" bIns="91425" lIns="91425" spcFirstLastPara="1" rIns="91425" wrap="square" tIns="91425">
+            <a:noAutofit/>
+          </a:bodyPr>
+          <a:lstStyle/>
+          <a:p>
+            <a:pPr indent="0" lvl="0" marL="0" rtl="0" algn="l">
+              <a:spcBef>
+                <a:spcPts val="0"/>
+              </a:spcBef>
+              <a:spcAft>
+                <a:spcPts val="0"/>
+              </a:spcAft>
+              <a:buNone/>
+            </a:pPr>
+            <a:r>
+              <a:t/>
+            </a:r>
+            <a:endParaRPr/>
+          </a:p>
+        </p:txBody>
+      </p:sp>
+    </p:spTree>
+  </p:cSld>
+  <p:clrMapOvr>
+    <a:masterClrMapping/>
+  </p:clrMapOvr>
+</p:notes>
+</file>
+
+<file path=ppt/notesSlides/notesSlide12.xml><?xml version="1.0" encoding="utf-8"?>
+<p:notes xmlns:a="http://schemas.openxmlformats.org/drawingml/2006/main" xmlns:r="http://schemas.openxmlformats.org/officeDocument/2006/relationships" xmlns:mc="http://schemas.openxmlformats.org/markup-compatibility/2006" xmlns:mv="urn:schemas-microsoft-com:mac:vml" xmlns:p="http://schemas.openxmlformats.org/presentationml/2006/main" xmlns:c="http://schemas.openxmlformats.org/drawingml/2006/chart" xmlns:dgm="http://schemas.openxmlformats.org/drawingml/2006/diagram" xmlns:o="urn:schemas-microsoft-com:office:office" xmlns:v="urn:schemas-microsoft-com:vml" xmlns:pvml="urn:schemas-microsoft-com:office:powerpoint" xmlns:com="http://schemas.openxmlformats.org/drawingml/2006/compatibility" xmlns:p14="http://schemas.microsoft.com/office/powerpoint/2010/main" xmlns:p15="http://schemas.microsoft.com/office/powerpoint/2012/main" xmlns:ahyp="http://schemas.microsoft.com/office/drawing/2018/hyperlinkcolor" showMasterPhAnim="0" showMasterSp="0">
+  <p:cSld>
+    <p:spTree>
+      <p:nvGrpSpPr>
+        <p:cNvPr id="133" name="Shape 133"/>
+        <p:cNvGrpSpPr/>
+        <p:nvPr/>
+      </p:nvGrpSpPr>
+      <p:grpSpPr>
+        <a:xfrm>
+          <a:off x="0" y="0"/>
+          <a:ext cx="0" cy="0"/>
+          <a:chOff x="0" y="0"/>
+          <a:chExt cx="0" cy="0"/>
+        </a:xfrm>
+      </p:grpSpPr>
+      <p:sp>
+        <p:nvSpPr>
+          <p:cNvPr id="134" name="Google Shape;134;g25779a769d4_0_6:notes"/>
+          <p:cNvSpPr/>
+          <p:nvPr>
+            <p:ph idx="2" type="sldImg"/>
+          </p:nvPr>
+        </p:nvSpPr>
+        <p:spPr>
+          <a:xfrm>
+            <a:off x="381300" y="685800"/>
+            <a:ext cx="6096000" cy="3429000"/>
+          </a:xfrm>
+          <a:custGeom>
+            <a:rect b="b" l="l" r="r" t="t"/>
+            <a:pathLst>
+              <a:path extrusionOk="0" h="120000" w="120000">
+                <a:moveTo>
+                  <a:pt x="0" y="0"/>
+                </a:moveTo>
+                <a:lnTo>
+                  <a:pt x="120000" y="0"/>
+                </a:lnTo>
+                <a:lnTo>
+                  <a:pt x="120000" y="120000"/>
+                </a:lnTo>
+                <a:lnTo>
+                  <a:pt x="0" y="120000"/>
+                </a:lnTo>
+                <a:close/>
+              </a:path>
+            </a:pathLst>
+          </a:custGeom>
+        </p:spPr>
+      </p:sp>
+      <p:sp>
+        <p:nvSpPr>
+          <p:cNvPr id="135" name="Google Shape;135;g25779a769d4_0_6:notes"/>
+          <p:cNvSpPr txBox="1"/>
+          <p:nvPr>
+            <p:ph idx="1" type="body"/>
+          </p:nvPr>
+        </p:nvSpPr>
+        <p:spPr>
+          <a:xfrm>
+            <a:off x="685800" y="4343400"/>
+            <a:ext cx="5486400" cy="4114800"/>
+          </a:xfrm>
+          <a:prstGeom prst="rect">
+            <a:avLst/>
+          </a:prstGeom>
+        </p:spPr>
+        <p:txBody>
+          <a:bodyPr anchorCtr="0" anchor="t" bIns="91425" lIns="91425" spcFirstLastPara="1" rIns="91425" wrap="square" tIns="91425">
+            <a:noAutofit/>
+          </a:bodyPr>
+          <a:lstStyle/>
+          <a:p>
+            <a:pPr indent="0" lvl="0" marL="0" rtl="0" algn="l">
+              <a:spcBef>
+                <a:spcPts val="0"/>
+              </a:spcBef>
+              <a:spcAft>
+                <a:spcPts val="0"/>
+              </a:spcAft>
+              <a:buNone/>
+            </a:pPr>
+            <a:r>
+              <a:t/>
+            </a:r>
+            <a:endParaRPr/>
+          </a:p>
+        </p:txBody>
+      </p:sp>
+    </p:spTree>
+  </p:cSld>
+  <p:clrMapOvr>
+    <a:masterClrMapping/>
+  </p:clrMapOvr>
+</p:notes>
+</file>
+
+<file path=ppt/notesSlides/notesSlide13.xml><?xml version="1.0" encoding="utf-8"?>
+<p:notes xmlns:a="http://schemas.openxmlformats.org/drawingml/2006/main" xmlns:r="http://schemas.openxmlformats.org/officeDocument/2006/relationships" xmlns:mc="http://schemas.openxmlformats.org/markup-compatibility/2006" xmlns:mv="urn:schemas-microsoft-com:mac:vml" xmlns:p="http://schemas.openxmlformats.org/presentationml/2006/main" xmlns:c="http://schemas.openxmlformats.org/drawingml/2006/chart" xmlns:dgm="http://schemas.openxmlformats.org/drawingml/2006/diagram" xmlns:o="urn:schemas-microsoft-com:office:office" xmlns:v="urn:schemas-microsoft-com:vml" xmlns:pvml="urn:schemas-microsoft-com:office:powerpoint" xmlns:com="http://schemas.openxmlformats.org/drawingml/2006/compatibility" xmlns:p14="http://schemas.microsoft.com/office/powerpoint/2010/main" xmlns:p15="http://schemas.microsoft.com/office/powerpoint/2012/main" xmlns:ahyp="http://schemas.microsoft.com/office/drawing/2018/hyperlinkcolor" showMasterPhAnim="0" showMasterSp="0">
+  <p:cSld>
+    <p:spTree>
+      <p:nvGrpSpPr>
+        <p:cNvPr id="140" name="Shape 140"/>
+        <p:cNvGrpSpPr/>
+        <p:nvPr/>
+      </p:nvGrpSpPr>
+      <p:grpSpPr>
+        <a:xfrm>
+          <a:off x="0" y="0"/>
+          <a:ext cx="0" cy="0"/>
+          <a:chOff x="0" y="0"/>
+          <a:chExt cx="0" cy="0"/>
+        </a:xfrm>
+      </p:grpSpPr>
+      <p:sp>
+        <p:nvSpPr>
+          <p:cNvPr id="141" name="Google Shape;141;g25779a769d4_0_13:notes"/>
+          <p:cNvSpPr/>
+          <p:nvPr>
+            <p:ph idx="2" type="sldImg"/>
+          </p:nvPr>
+        </p:nvSpPr>
+        <p:spPr>
+          <a:xfrm>
+            <a:off x="381300" y="685800"/>
+            <a:ext cx="6096000" cy="3429000"/>
+          </a:xfrm>
+          <a:custGeom>
+            <a:rect b="b" l="l" r="r" t="t"/>
+            <a:pathLst>
+              <a:path extrusionOk="0" h="120000" w="120000">
+                <a:moveTo>
+                  <a:pt x="0" y="0"/>
+                </a:moveTo>
+                <a:lnTo>
+                  <a:pt x="120000" y="0"/>
+                </a:lnTo>
+                <a:lnTo>
+                  <a:pt x="120000" y="120000"/>
+                </a:lnTo>
+                <a:lnTo>
+                  <a:pt x="0" y="120000"/>
+                </a:lnTo>
+                <a:close/>
+              </a:path>
+            </a:pathLst>
+          </a:custGeom>
+        </p:spPr>
+      </p:sp>
+      <p:sp>
+        <p:nvSpPr>
+          <p:cNvPr id="142" name="Google Shape;142;g25779a769d4_0_13:notes"/>
           <p:cNvSpPr txBox="1"/>
           <p:nvPr>
             <p:ph idx="1" type="body"/>
@@ -1294,7 +1594,7 @@
   <p:cSld>
     <p:spTree>
       <p:nvGrpSpPr>
-        <p:cNvPr id="83" name="Shape 83"/>
+        <p:cNvPr id="84" name="Shape 84"/>
         <p:cNvGrpSpPr/>
         <p:nvPr/>
       </p:nvGrpSpPr>
@@ -1308,7 +1608,7 @@
       </p:grpSpPr>
       <p:sp>
         <p:nvSpPr>
-          <p:cNvPr id="84" name="Google Shape;84;g25480cdd8c2_0_58:notes"/>
+          <p:cNvPr id="85" name="Google Shape;85;g25480cdd8c2_0_58:notes"/>
           <p:cNvSpPr/>
           <p:nvPr>
             <p:ph idx="2" type="sldImg"/>
@@ -1343,7 +1643,7 @@
       </p:sp>
       <p:sp>
         <p:nvSpPr>
-          <p:cNvPr id="85" name="Google Shape;85;g25480cdd8c2_0_58:notes"/>
+          <p:cNvPr id="86" name="Google Shape;86;g25480cdd8c2_0_58:notes"/>
           <p:cNvSpPr txBox="1"/>
           <p:nvPr>
             <p:ph idx="1" type="body"/>
@@ -1393,7 +1693,7 @@
   <p:cSld>
     <p:spTree>
       <p:nvGrpSpPr>
-        <p:cNvPr id="91" name="Shape 91"/>
+        <p:cNvPr id="93" name="Shape 93"/>
         <p:cNvGrpSpPr/>
         <p:nvPr/>
       </p:nvGrpSpPr>
@@ -1407,7 +1707,7 @@
       </p:grpSpPr>
       <p:sp>
         <p:nvSpPr>
-          <p:cNvPr id="92" name="Google Shape;92;g25480cdd8c2_0_65:notes"/>
+          <p:cNvPr id="94" name="Google Shape;94;g25480cdd8c2_0_65:notes"/>
           <p:cNvSpPr/>
           <p:nvPr>
             <p:ph idx="2" type="sldImg"/>
@@ -1442,7 +1742,7 @@
       </p:sp>
       <p:sp>
         <p:nvSpPr>
-          <p:cNvPr id="93" name="Google Shape;93;g25480cdd8c2_0_65:notes"/>
+          <p:cNvPr id="95" name="Google Shape;95;g25480cdd8c2_0_65:notes"/>
           <p:cNvSpPr txBox="1"/>
           <p:nvPr>
             <p:ph idx="1" type="body"/>
@@ -1492,7 +1792,7 @@
   <p:cSld>
     <p:spTree>
       <p:nvGrpSpPr>
-        <p:cNvPr id="99" name="Shape 99"/>
+        <p:cNvPr id="102" name="Shape 102"/>
         <p:cNvGrpSpPr/>
         <p:nvPr/>
       </p:nvGrpSpPr>
@@ -1506,7 +1806,7 @@
       </p:grpSpPr>
       <p:sp>
         <p:nvSpPr>
-          <p:cNvPr id="100" name="Google Shape;100;g25480cdd8c2_0_37:notes"/>
+          <p:cNvPr id="103" name="Google Shape;103;g25480cdd8c2_0_37:notes"/>
           <p:cNvSpPr/>
           <p:nvPr>
             <p:ph idx="2" type="sldImg"/>
@@ -1541,7 +1841,7 @@
       </p:sp>
       <p:sp>
         <p:nvSpPr>
-          <p:cNvPr id="101" name="Google Shape;101;g25480cdd8c2_0_37:notes"/>
+          <p:cNvPr id="104" name="Google Shape;104;g25480cdd8c2_0_37:notes"/>
           <p:cNvSpPr txBox="1"/>
           <p:nvPr>
             <p:ph idx="1" type="body"/>
@@ -1591,7 +1891,7 @@
   <p:cSld>
     <p:spTree>
       <p:nvGrpSpPr>
-        <p:cNvPr id="106" name="Shape 106"/>
+        <p:cNvPr id="110" name="Shape 110"/>
         <p:cNvGrpSpPr/>
         <p:nvPr/>
       </p:nvGrpSpPr>
@@ -1605,7 +1905,7 @@
       </p:grpSpPr>
       <p:sp>
         <p:nvSpPr>
-          <p:cNvPr id="107" name="Google Shape;107;g25480cdd8c2_0_50:notes"/>
+          <p:cNvPr id="111" name="Google Shape;111;g25480cdd8c2_0_50:notes"/>
           <p:cNvSpPr/>
           <p:nvPr>
             <p:ph idx="2" type="sldImg"/>
@@ -1640,7 +1940,7 @@
       </p:sp>
       <p:sp>
         <p:nvSpPr>
-          <p:cNvPr id="108" name="Google Shape;108;g25480cdd8c2_0_50:notes"/>
+          <p:cNvPr id="112" name="Google Shape;112;g25480cdd8c2_0_50:notes"/>
           <p:cNvSpPr txBox="1"/>
           <p:nvPr>
             <p:ph idx="1" type="body"/>
@@ -6404,7 +6704,7 @@
   <p:cSld>
     <p:spTree>
       <p:nvGrpSpPr>
-        <p:cNvPr id="118" name="Shape 118"/>
+        <p:cNvPr id="123" name="Shape 123"/>
         <p:cNvGrpSpPr/>
         <p:nvPr/>
       </p:nvGrpSpPr>
@@ -6418,7 +6718,7 @@
       </p:grpSpPr>
       <p:sp>
         <p:nvSpPr>
-          <p:cNvPr id="119" name="Google Shape;119;p22"/>
+          <p:cNvPr id="124" name="Google Shape;124;p22"/>
           <p:cNvSpPr txBox="1"/>
           <p:nvPr>
             <p:ph type="title"/>
@@ -6458,7 +6758,7 @@
       </p:sp>
       <p:pic>
         <p:nvPicPr>
-          <p:cNvPr id="120" name="Google Shape;120;p22"/>
+          <p:cNvPr id="125" name="Google Shape;125;p22"/>
           <p:cNvPicPr preferRelativeResize="0"/>
           <p:nvPr/>
         </p:nvPicPr>
@@ -6474,6 +6774,519 @@
           <a:xfrm>
             <a:off x="179925" y="1766600"/>
             <a:ext cx="8839200" cy="1349537"/>
+          </a:xfrm>
+          <a:prstGeom prst="rect">
+            <a:avLst/>
+          </a:prstGeom>
+          <a:noFill/>
+          <a:ln>
+            <a:noFill/>
+          </a:ln>
+        </p:spPr>
+      </p:pic>
+    </p:spTree>
+  </p:cSld>
+  <p:clrMapOvr>
+    <a:masterClrMapping/>
+  </p:clrMapOvr>
+</p:sld>
+</file>
+
+<file path=ppt/slides/slide11.xml><?xml version="1.0" encoding="utf-8"?>
+<p:sld xmlns:a="http://schemas.openxmlformats.org/drawingml/2006/main" xmlns:r="http://schemas.openxmlformats.org/officeDocument/2006/relationships" xmlns:mc="http://schemas.openxmlformats.org/markup-compatibility/2006" xmlns:mv="urn:schemas-microsoft-com:mac:vml" xmlns:p="http://schemas.openxmlformats.org/presentationml/2006/main" xmlns:c="http://schemas.openxmlformats.org/drawingml/2006/chart" xmlns:dgm="http://schemas.openxmlformats.org/drawingml/2006/diagram" xmlns:o="urn:schemas-microsoft-com:office:office" xmlns:v="urn:schemas-microsoft-com:vml" xmlns:pvml="urn:schemas-microsoft-com:office:powerpoint" xmlns:com="http://schemas.openxmlformats.org/drawingml/2006/compatibility" xmlns:p14="http://schemas.microsoft.com/office/powerpoint/2010/main" xmlns:p15="http://schemas.microsoft.com/office/powerpoint/2012/main" xmlns:ahyp="http://schemas.microsoft.com/office/drawing/2018/hyperlinkcolor">
+  <p:cSld>
+    <p:spTree>
+      <p:nvGrpSpPr>
+        <p:cNvPr id="129" name="Shape 129"/>
+        <p:cNvGrpSpPr/>
+        <p:nvPr/>
+      </p:nvGrpSpPr>
+      <p:grpSpPr>
+        <a:xfrm>
+          <a:off x="0" y="0"/>
+          <a:ext cx="0" cy="0"/>
+          <a:chOff x="0" y="0"/>
+          <a:chExt cx="0" cy="0"/>
+        </a:xfrm>
+      </p:grpSpPr>
+      <p:sp>
+        <p:nvSpPr>
+          <p:cNvPr id="130" name="Google Shape;130;p23"/>
+          <p:cNvSpPr txBox="1"/>
+          <p:nvPr>
+            <p:ph type="title"/>
+          </p:nvPr>
+        </p:nvSpPr>
+        <p:spPr>
+          <a:xfrm>
+            <a:off x="311700" y="445025"/>
+            <a:ext cx="8520600" cy="572700"/>
+          </a:xfrm>
+          <a:prstGeom prst="rect">
+            <a:avLst/>
+          </a:prstGeom>
+        </p:spPr>
+        <p:txBody>
+          <a:bodyPr anchorCtr="0" anchor="t" bIns="91425" lIns="91425" spcFirstLastPara="1" rIns="91425" wrap="square" tIns="91425">
+            <a:normAutofit fontScale="90000"/>
+          </a:bodyPr>
+          <a:lstStyle/>
+          <a:p>
+            <a:pPr indent="0" lvl="0" marL="0" rtl="0" algn="l">
+              <a:spcBef>
+                <a:spcPts val="0"/>
+              </a:spcBef>
+              <a:spcAft>
+                <a:spcPts val="0"/>
+              </a:spcAft>
+              <a:buNone/>
+            </a:pPr>
+            <a:r>
+              <a:rPr lang="en"/>
+              <a:t>Experimental Results</a:t>
+            </a:r>
+            <a:endParaRPr/>
+          </a:p>
+        </p:txBody>
+      </p:sp>
+      <p:sp>
+        <p:nvSpPr>
+          <p:cNvPr id="131" name="Google Shape;131;p23"/>
+          <p:cNvSpPr txBox="1"/>
+          <p:nvPr>
+            <p:ph idx="1" type="body"/>
+          </p:nvPr>
+        </p:nvSpPr>
+        <p:spPr>
+          <a:xfrm>
+            <a:off x="311700" y="1152475"/>
+            <a:ext cx="3745800" cy="3416400"/>
+          </a:xfrm>
+          <a:prstGeom prst="rect">
+            <a:avLst/>
+          </a:prstGeom>
+        </p:spPr>
+        <p:txBody>
+          <a:bodyPr anchorCtr="0" anchor="t" bIns="91425" lIns="91425" spcFirstLastPara="1" rIns="91425" wrap="square" tIns="91425">
+            <a:normAutofit/>
+          </a:bodyPr>
+          <a:lstStyle/>
+          <a:p>
+            <a:pPr indent="0" lvl="0" marL="0" rtl="0" algn="l">
+              <a:spcBef>
+                <a:spcPts val="0"/>
+              </a:spcBef>
+              <a:spcAft>
+                <a:spcPts val="1200"/>
+              </a:spcAft>
+              <a:buNone/>
+            </a:pPr>
+            <a:r>
+              <a:rPr lang="en"/>
+              <a:t>IGW beats Epsilon-Greedy while still being model class agnostic</a:t>
+            </a:r>
+            <a:endParaRPr/>
+          </a:p>
+        </p:txBody>
+      </p:sp>
+      <p:pic>
+        <p:nvPicPr>
+          <p:cNvPr id="132" name="Google Shape;132;p23"/>
+          <p:cNvPicPr preferRelativeResize="0"/>
+          <p:nvPr/>
+        </p:nvPicPr>
+        <p:blipFill>
+          <a:blip r:embed="rId3">
+            <a:alphaModFix/>
+          </a:blip>
+          <a:stretch>
+            <a:fillRect/>
+          </a:stretch>
+        </p:blipFill>
+        <p:spPr>
+          <a:xfrm>
+            <a:off x="4246415" y="1042349"/>
+            <a:ext cx="4451510" cy="3164150"/>
+          </a:xfrm>
+          <a:prstGeom prst="rect">
+            <a:avLst/>
+          </a:prstGeom>
+          <a:noFill/>
+          <a:ln>
+            <a:noFill/>
+          </a:ln>
+        </p:spPr>
+      </p:pic>
+    </p:spTree>
+  </p:cSld>
+  <p:clrMapOvr>
+    <a:masterClrMapping/>
+  </p:clrMapOvr>
+</p:sld>
+</file>
+
+<file path=ppt/slides/slide12.xml><?xml version="1.0" encoding="utf-8"?>
+<p:sld xmlns:a="http://schemas.openxmlformats.org/drawingml/2006/main" xmlns:r="http://schemas.openxmlformats.org/officeDocument/2006/relationships" xmlns:mc="http://schemas.openxmlformats.org/markup-compatibility/2006" xmlns:mv="urn:schemas-microsoft-com:mac:vml" xmlns:p="http://schemas.openxmlformats.org/presentationml/2006/main" xmlns:c="http://schemas.openxmlformats.org/drawingml/2006/chart" xmlns:dgm="http://schemas.openxmlformats.org/drawingml/2006/diagram" xmlns:o="urn:schemas-microsoft-com:office:office" xmlns:v="urn:schemas-microsoft-com:vml" xmlns:pvml="urn:schemas-microsoft-com:office:powerpoint" xmlns:com="http://schemas.openxmlformats.org/drawingml/2006/compatibility" xmlns:p14="http://schemas.microsoft.com/office/powerpoint/2010/main" xmlns:p15="http://schemas.microsoft.com/office/powerpoint/2012/main" xmlns:ahyp="http://schemas.microsoft.com/office/drawing/2018/hyperlinkcolor">
+  <p:cSld>
+    <p:spTree>
+      <p:nvGrpSpPr>
+        <p:cNvPr id="136" name="Shape 136"/>
+        <p:cNvGrpSpPr/>
+        <p:nvPr/>
+      </p:nvGrpSpPr>
+      <p:grpSpPr>
+        <a:xfrm>
+          <a:off x="0" y="0"/>
+          <a:ext cx="0" cy="0"/>
+          <a:chOff x="0" y="0"/>
+          <a:chExt cx="0" cy="0"/>
+        </a:xfrm>
+      </p:grpSpPr>
+      <p:sp>
+        <p:nvSpPr>
+          <p:cNvPr id="137" name="Google Shape;137;p24"/>
+          <p:cNvSpPr txBox="1"/>
+          <p:nvPr>
+            <p:ph type="title"/>
+          </p:nvPr>
+        </p:nvSpPr>
+        <p:spPr>
+          <a:xfrm>
+            <a:off x="311700" y="445025"/>
+            <a:ext cx="8520600" cy="572700"/>
+          </a:xfrm>
+          <a:prstGeom prst="rect">
+            <a:avLst/>
+          </a:prstGeom>
+        </p:spPr>
+        <p:txBody>
+          <a:bodyPr anchorCtr="0" anchor="t" bIns="91425" lIns="91425" spcFirstLastPara="1" rIns="91425" wrap="square" tIns="91425">
+            <a:normAutofit fontScale="90000"/>
+          </a:bodyPr>
+          <a:lstStyle/>
+          <a:p>
+            <a:pPr indent="0" lvl="0" marL="0" rtl="0" algn="l">
+              <a:spcBef>
+                <a:spcPts val="0"/>
+              </a:spcBef>
+              <a:spcAft>
+                <a:spcPts val="0"/>
+              </a:spcAft>
+              <a:buNone/>
+            </a:pPr>
+            <a:r>
+              <a:rPr lang="en"/>
+              <a:t>Experimental Results</a:t>
+            </a:r>
+            <a:endParaRPr/>
+          </a:p>
+        </p:txBody>
+      </p:sp>
+      <p:sp>
+        <p:nvSpPr>
+          <p:cNvPr id="138" name="Google Shape;138;p24"/>
+          <p:cNvSpPr txBox="1"/>
+          <p:nvPr>
+            <p:ph idx="1" type="body"/>
+          </p:nvPr>
+        </p:nvSpPr>
+        <p:spPr>
+          <a:xfrm>
+            <a:off x="311700" y="1152475"/>
+            <a:ext cx="3745800" cy="3416400"/>
+          </a:xfrm>
+          <a:prstGeom prst="rect">
+            <a:avLst/>
+          </a:prstGeom>
+        </p:spPr>
+        <p:txBody>
+          <a:bodyPr anchorCtr="0" anchor="t" bIns="91425" lIns="91425" spcFirstLastPara="1" rIns="91425" wrap="square" tIns="91425">
+            <a:normAutofit/>
+          </a:bodyPr>
+          <a:lstStyle/>
+          <a:p>
+            <a:pPr indent="0" lvl="0" marL="0" rtl="0" algn="l">
+              <a:spcBef>
+                <a:spcPts val="0"/>
+              </a:spcBef>
+              <a:spcAft>
+                <a:spcPts val="1200"/>
+              </a:spcAft>
+              <a:buNone/>
+            </a:pPr>
+            <a:r>
+              <a:rPr lang="en"/>
+              <a:t>IGW beats LinUCB when the very strict assumptions of LinUCB are violated.</a:t>
+            </a:r>
+            <a:endParaRPr/>
+          </a:p>
+        </p:txBody>
+      </p:sp>
+      <p:pic>
+        <p:nvPicPr>
+          <p:cNvPr id="139" name="Google Shape;139;p24"/>
+          <p:cNvPicPr preferRelativeResize="0"/>
+          <p:nvPr/>
+        </p:nvPicPr>
+        <p:blipFill>
+          <a:blip r:embed="rId3">
+            <a:alphaModFix/>
+          </a:blip>
+          <a:stretch>
+            <a:fillRect/>
+          </a:stretch>
+        </p:blipFill>
+        <p:spPr>
+          <a:xfrm>
+            <a:off x="4413025" y="1113450"/>
+            <a:ext cx="4486799" cy="3256375"/>
+          </a:xfrm>
+          <a:prstGeom prst="rect">
+            <a:avLst/>
+          </a:prstGeom>
+          <a:noFill/>
+          <a:ln>
+            <a:noFill/>
+          </a:ln>
+        </p:spPr>
+      </p:pic>
+    </p:spTree>
+  </p:cSld>
+  <p:clrMapOvr>
+    <a:masterClrMapping/>
+  </p:clrMapOvr>
+</p:sld>
+</file>
+
+<file path=ppt/slides/slide13.xml><?xml version="1.0" encoding="utf-8"?>
+<p:sld xmlns:a="http://schemas.openxmlformats.org/drawingml/2006/main" xmlns:r="http://schemas.openxmlformats.org/officeDocument/2006/relationships" xmlns:mc="http://schemas.openxmlformats.org/markup-compatibility/2006" xmlns:mv="urn:schemas-microsoft-com:mac:vml" xmlns:p="http://schemas.openxmlformats.org/presentationml/2006/main" xmlns:c="http://schemas.openxmlformats.org/drawingml/2006/chart" xmlns:dgm="http://schemas.openxmlformats.org/drawingml/2006/diagram" xmlns:o="urn:schemas-microsoft-com:office:office" xmlns:v="urn:schemas-microsoft-com:vml" xmlns:pvml="urn:schemas-microsoft-com:office:powerpoint" xmlns:com="http://schemas.openxmlformats.org/drawingml/2006/compatibility" xmlns:p14="http://schemas.microsoft.com/office/powerpoint/2010/main" xmlns:p15="http://schemas.microsoft.com/office/powerpoint/2012/main" xmlns:ahyp="http://schemas.microsoft.com/office/drawing/2018/hyperlinkcolor">
+  <p:cSld>
+    <p:spTree>
+      <p:nvGrpSpPr>
+        <p:cNvPr id="143" name="Shape 143"/>
+        <p:cNvGrpSpPr/>
+        <p:nvPr/>
+      </p:nvGrpSpPr>
+      <p:grpSpPr>
+        <a:xfrm>
+          <a:off x="0" y="0"/>
+          <a:ext cx="0" cy="0"/>
+          <a:chOff x="0" y="0"/>
+          <a:chExt cx="0" cy="0"/>
+        </a:xfrm>
+      </p:grpSpPr>
+      <p:pic>
+        <p:nvPicPr>
+          <p:cNvPr id="144" name="Google Shape;144;p25"/>
+          <p:cNvPicPr preferRelativeResize="0"/>
+          <p:nvPr/>
+        </p:nvPicPr>
+        <p:blipFill>
+          <a:blip r:embed="rId3">
+            <a:alphaModFix/>
+          </a:blip>
+          <a:stretch>
+            <a:fillRect/>
+          </a:stretch>
+        </p:blipFill>
+        <p:spPr>
+          <a:xfrm>
+            <a:off x="4915091" y="1017730"/>
+            <a:ext cx="2707786" cy="1963225"/>
+          </a:xfrm>
+          <a:prstGeom prst="rect">
+            <a:avLst/>
+          </a:prstGeom>
+          <a:noFill/>
+          <a:ln>
+            <a:noFill/>
+          </a:ln>
+        </p:spPr>
+      </p:pic>
+      <p:sp>
+        <p:nvSpPr>
+          <p:cNvPr id="145" name="Google Shape;145;p25"/>
+          <p:cNvSpPr txBox="1"/>
+          <p:nvPr>
+            <p:ph type="title"/>
+          </p:nvPr>
+        </p:nvSpPr>
+        <p:spPr>
+          <a:xfrm>
+            <a:off x="311700" y="445025"/>
+            <a:ext cx="8520600" cy="572700"/>
+          </a:xfrm>
+          <a:prstGeom prst="rect">
+            <a:avLst/>
+          </a:prstGeom>
+        </p:spPr>
+        <p:txBody>
+          <a:bodyPr anchorCtr="0" anchor="t" bIns="91425" lIns="91425" spcFirstLastPara="1" rIns="91425" wrap="square" tIns="91425">
+            <a:normAutofit fontScale="90000"/>
+          </a:bodyPr>
+          <a:lstStyle/>
+          <a:p>
+            <a:pPr indent="0" lvl="0" marL="0" rtl="0" algn="l">
+              <a:spcBef>
+                <a:spcPts val="0"/>
+              </a:spcBef>
+              <a:spcAft>
+                <a:spcPts val="0"/>
+              </a:spcAft>
+              <a:buNone/>
+            </a:pPr>
+            <a:r>
+              <a:rPr lang="en"/>
+              <a:t>Experimental Results</a:t>
+            </a:r>
+            <a:endParaRPr/>
+          </a:p>
+        </p:txBody>
+      </p:sp>
+      <p:sp>
+        <p:nvSpPr>
+          <p:cNvPr id="146" name="Google Shape;146;p25"/>
+          <p:cNvSpPr txBox="1"/>
+          <p:nvPr>
+            <p:ph idx="1" type="body"/>
+          </p:nvPr>
+        </p:nvSpPr>
+        <p:spPr>
+          <a:xfrm>
+            <a:off x="311700" y="1152475"/>
+            <a:ext cx="3745800" cy="3416400"/>
+          </a:xfrm>
+          <a:prstGeom prst="rect">
+            <a:avLst/>
+          </a:prstGeom>
+        </p:spPr>
+        <p:txBody>
+          <a:bodyPr anchorCtr="0" anchor="t" bIns="91425" lIns="91425" spcFirstLastPara="1" rIns="91425" wrap="square" tIns="91425">
+            <a:normAutofit/>
+          </a:bodyPr>
+          <a:lstStyle/>
+          <a:p>
+            <a:pPr indent="0" lvl="0" marL="0" rtl="0" algn="l">
+              <a:spcBef>
+                <a:spcPts val="0"/>
+              </a:spcBef>
+              <a:spcAft>
+                <a:spcPts val="1200"/>
+              </a:spcAft>
+              <a:buNone/>
+            </a:pPr>
+            <a:r>
+              <a:rPr lang="en"/>
+              <a:t>CappedIGW* substantially beats epsilon-greedy in prediction time as the number of actions increases while losing only slightly in terms of total reward.</a:t>
+            </a:r>
+            <a:endParaRPr/>
+          </a:p>
+        </p:txBody>
+      </p:sp>
+      <p:sp>
+        <p:nvSpPr>
+          <p:cNvPr id="147" name="Google Shape;147;p25"/>
+          <p:cNvSpPr txBox="1"/>
+          <p:nvPr/>
+        </p:nvSpPr>
+        <p:spPr>
+          <a:xfrm>
+            <a:off x="541400" y="3768475"/>
+            <a:ext cx="3000000" cy="600300"/>
+          </a:xfrm>
+          <a:prstGeom prst="rect">
+            <a:avLst/>
+          </a:prstGeom>
+          <a:noFill/>
+          <a:ln>
+            <a:noFill/>
+          </a:ln>
+        </p:spPr>
+        <p:txBody>
+          <a:bodyPr anchorCtr="0" anchor="t" bIns="91425" lIns="91425" spcFirstLastPara="1" rIns="91425" wrap="square" tIns="91425">
+            <a:spAutoFit/>
+          </a:bodyPr>
+          <a:lstStyle/>
+          <a:p>
+            <a:pPr indent="0" lvl="0" marL="0" rtl="0" algn="l">
+              <a:spcBef>
+                <a:spcPts val="0"/>
+              </a:spcBef>
+              <a:spcAft>
+                <a:spcPts val="0"/>
+              </a:spcAft>
+              <a:buNone/>
+            </a:pPr>
+            <a:r>
+              <a:rPr lang="en" sz="900">
+                <a:solidFill>
+                  <a:srgbClr val="666666"/>
+                </a:solidFill>
+                <a:highlight>
+                  <a:srgbClr val="FFFFFF"/>
+                </a:highlight>
+              </a:rPr>
+              <a:t>* </a:t>
+            </a:r>
+            <a:r>
+              <a:rPr lang="en" sz="900">
+                <a:solidFill>
+                  <a:srgbClr val="666666"/>
+                </a:solidFill>
+                <a:highlight>
+                  <a:srgbClr val="FFFFFF"/>
+                </a:highlight>
+              </a:rPr>
+              <a:t>Rucker, Mark, Yinglun Zhu, and Paul Mineiro. "Infinite Action Contextual Bandits with Reusable Data Exhaust." </a:t>
+            </a:r>
+            <a:r>
+              <a:rPr i="1" lang="en" sz="900">
+                <a:solidFill>
+                  <a:srgbClr val="666666"/>
+                </a:solidFill>
+                <a:highlight>
+                  <a:srgbClr val="FFFFFF"/>
+                </a:highlight>
+              </a:rPr>
+              <a:t>arXiv preprint arXiv:2302.08551</a:t>
+            </a:r>
+            <a:r>
+              <a:rPr lang="en" sz="900">
+                <a:solidFill>
+                  <a:srgbClr val="666666"/>
+                </a:solidFill>
+                <a:highlight>
+                  <a:srgbClr val="FFFFFF"/>
+                </a:highlight>
+              </a:rPr>
+              <a:t> (2023).</a:t>
+            </a:r>
+            <a:endParaRPr sz="1300">
+              <a:solidFill>
+                <a:srgbClr val="666666"/>
+              </a:solidFill>
+            </a:endParaRPr>
+          </a:p>
+        </p:txBody>
+      </p:sp>
+      <p:pic>
+        <p:nvPicPr>
+          <p:cNvPr id="148" name="Google Shape;148;p25"/>
+          <p:cNvPicPr preferRelativeResize="0"/>
+          <p:nvPr/>
+        </p:nvPicPr>
+        <p:blipFill>
+          <a:blip r:embed="rId4">
+            <a:alphaModFix/>
+          </a:blip>
+          <a:stretch>
+            <a:fillRect/>
+          </a:stretch>
+        </p:blipFill>
+        <p:spPr>
+          <a:xfrm>
+            <a:off x="4893526" y="2679080"/>
+            <a:ext cx="2766076" cy="1963225"/>
           </a:xfrm>
           <a:prstGeom prst="rect">
             <a:avLst/>
@@ -7035,7 +7848,7 @@
         </p:nvSpPr>
         <p:spPr>
           <a:xfrm>
-            <a:off x="311700" y="1152475"/>
+            <a:off x="288775" y="1138700"/>
             <a:ext cx="8520600" cy="3416400"/>
           </a:xfrm>
           <a:prstGeom prst="rect">
@@ -7189,8 +8002,8 @@
         </p:nvSpPr>
         <p:spPr>
           <a:xfrm>
-            <a:off x="5395250" y="1536738"/>
-            <a:ext cx="3128700" cy="1477500"/>
+            <a:off x="4534800" y="1397100"/>
+            <a:ext cx="4108500" cy="692700"/>
           </a:xfrm>
           <a:prstGeom prst="rect">
             <a:avLst/>
@@ -7216,9 +8029,9 @@
               <a:buNone/>
             </a:pPr>
             <a:r>
-              <a:rPr lang="en">
+              <a:rPr lang="en" sz="1100">
                 <a:solidFill>
-                  <a:srgbClr val="222222"/>
+                  <a:srgbClr val="666666"/>
                 </a:solidFill>
                 <a:highlight>
                   <a:srgbClr val="FFFFFF"/>
@@ -7227,9 +8040,9 @@
               <a:t>Foster, Dylan, and Alexander Rakhlin. "Beyond ucb: Optimal and efficient contextual bandits with regression oracles." </a:t>
             </a:r>
             <a:r>
-              <a:rPr i="1" lang="en">
+              <a:rPr i="1" lang="en" sz="1100">
                 <a:solidFill>
-                  <a:srgbClr val="222222"/>
+                  <a:srgbClr val="666666"/>
                 </a:solidFill>
                 <a:highlight>
                   <a:srgbClr val="FFFFFF"/>
@@ -7238,9 +8051,9 @@
               <a:t>International Conference on Machine Learning</a:t>
             </a:r>
             <a:r>
-              <a:rPr lang="en">
+              <a:rPr lang="en" sz="1100">
                 <a:solidFill>
-                  <a:srgbClr val="222222"/>
+                  <a:srgbClr val="666666"/>
                 </a:solidFill>
                 <a:highlight>
                   <a:srgbClr val="FFFFFF"/>
@@ -7248,7 +8061,11 @@
               </a:rPr>
               <a:t>. PMLR, 2020.</a:t>
             </a:r>
-            <a:endParaRPr sz="1500"/>
+            <a:endParaRPr sz="1200">
+              <a:solidFill>
+                <a:srgbClr val="666666"/>
+              </a:solidFill>
+            </a:endParaRPr>
           </a:p>
         </p:txBody>
       </p:sp>
@@ -7344,6 +8161,81 @@
           </a:ln>
         </p:spPr>
       </p:pic>
+      <p:sp>
+        <p:nvSpPr>
+          <p:cNvPr id="83" name="Google Shape;83;p17"/>
+          <p:cNvSpPr txBox="1"/>
+          <p:nvPr/>
+        </p:nvSpPr>
+        <p:spPr>
+          <a:xfrm>
+            <a:off x="4723800" y="502375"/>
+            <a:ext cx="4108500" cy="692700"/>
+          </a:xfrm>
+          <a:prstGeom prst="rect">
+            <a:avLst/>
+          </a:prstGeom>
+          <a:noFill/>
+          <a:ln>
+            <a:noFill/>
+          </a:ln>
+        </p:spPr>
+        <p:txBody>
+          <a:bodyPr anchorCtr="0" anchor="t" bIns="91425" lIns="91425" spcFirstLastPara="1" rIns="91425" wrap="square" tIns="91425">
+            <a:spAutoFit/>
+          </a:bodyPr>
+          <a:lstStyle/>
+          <a:p>
+            <a:pPr indent="0" lvl="0" marL="0" rtl="0" algn="l">
+              <a:spcBef>
+                <a:spcPts val="0"/>
+              </a:spcBef>
+              <a:spcAft>
+                <a:spcPts val="0"/>
+              </a:spcAft>
+              <a:buNone/>
+            </a:pPr>
+            <a:r>
+              <a:rPr lang="en" sz="1100">
+                <a:solidFill>
+                  <a:srgbClr val="666666"/>
+                </a:solidFill>
+                <a:highlight>
+                  <a:srgbClr val="FFFFFF"/>
+                </a:highlight>
+              </a:rPr>
+              <a:t>Foster, Dylan, and Alexander Rakhlin. "Beyond ucb: Optimal and efficient contextual bandits with regression oracles." </a:t>
+            </a:r>
+            <a:r>
+              <a:rPr i="1" lang="en" sz="1100">
+                <a:solidFill>
+                  <a:srgbClr val="666666"/>
+                </a:solidFill>
+                <a:highlight>
+                  <a:srgbClr val="FFFFFF"/>
+                </a:highlight>
+              </a:rPr>
+              <a:t>International Conference on Machine Learning</a:t>
+            </a:r>
+            <a:r>
+              <a:rPr lang="en" sz="1100">
+                <a:solidFill>
+                  <a:srgbClr val="666666"/>
+                </a:solidFill>
+                <a:highlight>
+                  <a:srgbClr val="FFFFFF"/>
+                </a:highlight>
+              </a:rPr>
+              <a:t>. PMLR, 2020.</a:t>
+            </a:r>
+            <a:endParaRPr sz="1200">
+              <a:solidFill>
+                <a:srgbClr val="666666"/>
+              </a:solidFill>
+            </a:endParaRPr>
+          </a:p>
+        </p:txBody>
+      </p:sp>
     </p:spTree>
   </p:cSld>
   <p:clrMapOvr>
@@ -7357,7 +8249,7 @@
   <p:cSld>
     <p:spTree>
       <p:nvGrpSpPr>
-        <p:cNvPr id="86" name="Shape 86"/>
+        <p:cNvPr id="87" name="Shape 87"/>
         <p:cNvGrpSpPr/>
         <p:nvPr/>
       </p:nvGrpSpPr>
@@ -7371,7 +8263,7 @@
       </p:grpSpPr>
       <p:sp>
         <p:nvSpPr>
-          <p:cNvPr id="87" name="Google Shape;87;p18"/>
+          <p:cNvPr id="88" name="Google Shape;88;p18"/>
           <p:cNvSpPr txBox="1"/>
           <p:nvPr>
             <p:ph type="title"/>
@@ -7411,7 +8303,7 @@
       </p:sp>
       <p:pic>
         <p:nvPicPr>
-          <p:cNvPr id="88" name="Google Shape;88;p18"/>
+          <p:cNvPr id="89" name="Google Shape;89;p18"/>
           <p:cNvPicPr preferRelativeResize="0"/>
           <p:nvPr/>
         </p:nvPicPr>
@@ -7438,7 +8330,7 @@
       </p:pic>
       <p:sp>
         <p:nvSpPr>
-          <p:cNvPr id="89" name="Google Shape;89;p18"/>
+          <p:cNvPr id="90" name="Google Shape;90;p18"/>
           <p:cNvSpPr/>
           <p:nvPr/>
         </p:nvSpPr>
@@ -7485,7 +8377,7 @@
       </p:sp>
       <p:sp>
         <p:nvSpPr>
-          <p:cNvPr id="90" name="Google Shape;90;p18"/>
+          <p:cNvPr id="91" name="Google Shape;91;p18"/>
           <p:cNvSpPr txBox="1"/>
           <p:nvPr/>
         </p:nvSpPr>
@@ -7528,6 +8420,81 @@
             <a:endParaRPr>
               <a:solidFill>
                 <a:srgbClr val="38761D"/>
+              </a:solidFill>
+            </a:endParaRPr>
+          </a:p>
+        </p:txBody>
+      </p:sp>
+      <p:sp>
+        <p:nvSpPr>
+          <p:cNvPr id="92" name="Google Shape;92;p18"/>
+          <p:cNvSpPr txBox="1"/>
+          <p:nvPr/>
+        </p:nvSpPr>
+        <p:spPr>
+          <a:xfrm>
+            <a:off x="4723800" y="502375"/>
+            <a:ext cx="4108500" cy="692700"/>
+          </a:xfrm>
+          <a:prstGeom prst="rect">
+            <a:avLst/>
+          </a:prstGeom>
+          <a:noFill/>
+          <a:ln>
+            <a:noFill/>
+          </a:ln>
+        </p:spPr>
+        <p:txBody>
+          <a:bodyPr anchorCtr="0" anchor="t" bIns="91425" lIns="91425" spcFirstLastPara="1" rIns="91425" wrap="square" tIns="91425">
+            <a:spAutoFit/>
+          </a:bodyPr>
+          <a:lstStyle/>
+          <a:p>
+            <a:pPr indent="0" lvl="0" marL="0" rtl="0" algn="l">
+              <a:spcBef>
+                <a:spcPts val="0"/>
+              </a:spcBef>
+              <a:spcAft>
+                <a:spcPts val="0"/>
+              </a:spcAft>
+              <a:buNone/>
+            </a:pPr>
+            <a:r>
+              <a:rPr lang="en" sz="1100">
+                <a:solidFill>
+                  <a:srgbClr val="666666"/>
+                </a:solidFill>
+                <a:highlight>
+                  <a:srgbClr val="FFFFFF"/>
+                </a:highlight>
+              </a:rPr>
+              <a:t>Foster, Dylan, and Alexander Rakhlin. "Beyond ucb: Optimal and efficient contextual bandits with regression oracles." </a:t>
+            </a:r>
+            <a:r>
+              <a:rPr i="1" lang="en" sz="1100">
+                <a:solidFill>
+                  <a:srgbClr val="666666"/>
+                </a:solidFill>
+                <a:highlight>
+                  <a:srgbClr val="FFFFFF"/>
+                </a:highlight>
+              </a:rPr>
+              <a:t>International Conference on Machine Learning</a:t>
+            </a:r>
+            <a:r>
+              <a:rPr lang="en" sz="1100">
+                <a:solidFill>
+                  <a:srgbClr val="666666"/>
+                </a:solidFill>
+                <a:highlight>
+                  <a:srgbClr val="FFFFFF"/>
+                </a:highlight>
+              </a:rPr>
+              <a:t>. PMLR, 2020.</a:t>
+            </a:r>
+            <a:endParaRPr sz="1200">
+              <a:solidFill>
+                <a:srgbClr val="666666"/>
               </a:solidFill>
             </a:endParaRPr>
           </a:p>
@@ -7546,7 +8513,7 @@
   <p:cSld>
     <p:spTree>
       <p:nvGrpSpPr>
-        <p:cNvPr id="94" name="Shape 94"/>
+        <p:cNvPr id="96" name="Shape 96"/>
         <p:cNvGrpSpPr/>
         <p:nvPr/>
       </p:nvGrpSpPr>
@@ -7560,7 +8527,7 @@
       </p:grpSpPr>
       <p:sp>
         <p:nvSpPr>
-          <p:cNvPr id="95" name="Google Shape;95;p19"/>
+          <p:cNvPr id="97" name="Google Shape;97;p19"/>
           <p:cNvSpPr txBox="1"/>
           <p:nvPr>
             <p:ph type="title"/>
@@ -7600,7 +8567,7 @@
       </p:sp>
       <p:pic>
         <p:nvPicPr>
-          <p:cNvPr id="96" name="Google Shape;96;p19"/>
+          <p:cNvPr id="98" name="Google Shape;98;p19"/>
           <p:cNvPicPr preferRelativeResize="0"/>
           <p:nvPr/>
         </p:nvPicPr>
@@ -7627,7 +8594,7 @@
       </p:pic>
       <p:sp>
         <p:nvSpPr>
-          <p:cNvPr id="97" name="Google Shape;97;p19"/>
+          <p:cNvPr id="99" name="Google Shape;99;p19"/>
           <p:cNvSpPr/>
           <p:nvPr/>
         </p:nvSpPr>
@@ -7674,7 +8641,7 @@
       </p:sp>
       <p:sp>
         <p:nvSpPr>
-          <p:cNvPr id="98" name="Google Shape;98;p19"/>
+          <p:cNvPr id="100" name="Google Shape;100;p19"/>
           <p:cNvSpPr txBox="1"/>
           <p:nvPr/>
         </p:nvSpPr>
@@ -7717,6 +8684,81 @@
             <a:endParaRPr>
               <a:solidFill>
                 <a:srgbClr val="38761D"/>
+              </a:solidFill>
+            </a:endParaRPr>
+          </a:p>
+        </p:txBody>
+      </p:sp>
+      <p:sp>
+        <p:nvSpPr>
+          <p:cNvPr id="101" name="Google Shape;101;p19"/>
+          <p:cNvSpPr txBox="1"/>
+          <p:nvPr/>
+        </p:nvSpPr>
+        <p:spPr>
+          <a:xfrm>
+            <a:off x="4723800" y="502375"/>
+            <a:ext cx="4108500" cy="692700"/>
+          </a:xfrm>
+          <a:prstGeom prst="rect">
+            <a:avLst/>
+          </a:prstGeom>
+          <a:noFill/>
+          <a:ln>
+            <a:noFill/>
+          </a:ln>
+        </p:spPr>
+        <p:txBody>
+          <a:bodyPr anchorCtr="0" anchor="t" bIns="91425" lIns="91425" spcFirstLastPara="1" rIns="91425" wrap="square" tIns="91425">
+            <a:spAutoFit/>
+          </a:bodyPr>
+          <a:lstStyle/>
+          <a:p>
+            <a:pPr indent="0" lvl="0" marL="0" rtl="0" algn="l">
+              <a:spcBef>
+                <a:spcPts val="0"/>
+              </a:spcBef>
+              <a:spcAft>
+                <a:spcPts val="0"/>
+              </a:spcAft>
+              <a:buNone/>
+            </a:pPr>
+            <a:r>
+              <a:rPr lang="en" sz="1100">
+                <a:solidFill>
+                  <a:srgbClr val="666666"/>
+                </a:solidFill>
+                <a:highlight>
+                  <a:srgbClr val="FFFFFF"/>
+                </a:highlight>
+              </a:rPr>
+              <a:t>Foster, Dylan, and Alexander Rakhlin. "Beyond ucb: Optimal and efficient contextual bandits with regression oracles." </a:t>
+            </a:r>
+            <a:r>
+              <a:rPr i="1" lang="en" sz="1100">
+                <a:solidFill>
+                  <a:srgbClr val="666666"/>
+                </a:solidFill>
+                <a:highlight>
+                  <a:srgbClr val="FFFFFF"/>
+                </a:highlight>
+              </a:rPr>
+              <a:t>International Conference on Machine Learning</a:t>
+            </a:r>
+            <a:r>
+              <a:rPr lang="en" sz="1100">
+                <a:solidFill>
+                  <a:srgbClr val="666666"/>
+                </a:solidFill>
+                <a:highlight>
+                  <a:srgbClr val="FFFFFF"/>
+                </a:highlight>
+              </a:rPr>
+              <a:t>. PMLR, 2020.</a:t>
+            </a:r>
+            <a:endParaRPr sz="1200">
+              <a:solidFill>
+                <a:srgbClr val="666666"/>
               </a:solidFill>
             </a:endParaRPr>
           </a:p>
@@ -7735,7 +8777,7 @@
   <p:cSld>
     <p:spTree>
       <p:nvGrpSpPr>
-        <p:cNvPr id="102" name="Shape 102"/>
+        <p:cNvPr id="105" name="Shape 105"/>
         <p:cNvGrpSpPr/>
         <p:nvPr/>
       </p:nvGrpSpPr>
@@ -7749,7 +8791,7 @@
       </p:grpSpPr>
       <p:sp>
         <p:nvSpPr>
-          <p:cNvPr id="103" name="Google Shape;103;p20"/>
+          <p:cNvPr id="106" name="Google Shape;106;p20"/>
           <p:cNvSpPr txBox="1"/>
           <p:nvPr>
             <p:ph type="title"/>
@@ -7789,7 +8831,7 @@
       </p:sp>
       <p:pic>
         <p:nvPicPr>
-          <p:cNvPr id="104" name="Google Shape;104;p20"/>
+          <p:cNvPr id="107" name="Google Shape;107;p20"/>
           <p:cNvPicPr preferRelativeResize="0"/>
           <p:nvPr/>
         </p:nvPicPr>
@@ -7816,7 +8858,7 @@
       </p:pic>
       <p:pic>
         <p:nvPicPr>
-          <p:cNvPr id="105" name="Google Shape;105;p20"/>
+          <p:cNvPr id="108" name="Google Shape;108;p20"/>
           <p:cNvPicPr preferRelativeResize="0"/>
           <p:nvPr/>
         </p:nvPicPr>
@@ -7842,6 +8884,81 @@
           </a:ln>
         </p:spPr>
       </p:pic>
+      <p:sp>
+        <p:nvSpPr>
+          <p:cNvPr id="109" name="Google Shape;109;p20"/>
+          <p:cNvSpPr txBox="1"/>
+          <p:nvPr/>
+        </p:nvSpPr>
+        <p:spPr>
+          <a:xfrm>
+            <a:off x="4723800" y="502375"/>
+            <a:ext cx="4108500" cy="692700"/>
+          </a:xfrm>
+          <a:prstGeom prst="rect">
+            <a:avLst/>
+          </a:prstGeom>
+          <a:noFill/>
+          <a:ln>
+            <a:noFill/>
+          </a:ln>
+        </p:spPr>
+        <p:txBody>
+          <a:bodyPr anchorCtr="0" anchor="t" bIns="91425" lIns="91425" spcFirstLastPara="1" rIns="91425" wrap="square" tIns="91425">
+            <a:spAutoFit/>
+          </a:bodyPr>
+          <a:lstStyle/>
+          <a:p>
+            <a:pPr indent="0" lvl="0" marL="0" rtl="0" algn="l">
+              <a:spcBef>
+                <a:spcPts val="0"/>
+              </a:spcBef>
+              <a:spcAft>
+                <a:spcPts val="0"/>
+              </a:spcAft>
+              <a:buNone/>
+            </a:pPr>
+            <a:r>
+              <a:rPr lang="en" sz="1100">
+                <a:solidFill>
+                  <a:srgbClr val="666666"/>
+                </a:solidFill>
+                <a:highlight>
+                  <a:srgbClr val="FFFFFF"/>
+                </a:highlight>
+              </a:rPr>
+              <a:t>Foster, Dylan, and Alexander Rakhlin. "Beyond ucb: Optimal and efficient contextual bandits with regression oracles." </a:t>
+            </a:r>
+            <a:r>
+              <a:rPr i="1" lang="en" sz="1100">
+                <a:solidFill>
+                  <a:srgbClr val="666666"/>
+                </a:solidFill>
+                <a:highlight>
+                  <a:srgbClr val="FFFFFF"/>
+                </a:highlight>
+              </a:rPr>
+              <a:t>International Conference on Machine Learning</a:t>
+            </a:r>
+            <a:r>
+              <a:rPr lang="en" sz="1100">
+                <a:solidFill>
+                  <a:srgbClr val="666666"/>
+                </a:solidFill>
+                <a:highlight>
+                  <a:srgbClr val="FFFFFF"/>
+                </a:highlight>
+              </a:rPr>
+              <a:t>. PMLR, 2020.</a:t>
+            </a:r>
+            <a:endParaRPr sz="1200">
+              <a:solidFill>
+                <a:srgbClr val="666666"/>
+              </a:solidFill>
+            </a:endParaRPr>
+          </a:p>
+        </p:txBody>
+      </p:sp>
     </p:spTree>
   </p:cSld>
   <p:clrMapOvr>
@@ -7855,7 +8972,7 @@
   <p:cSld>
     <p:spTree>
       <p:nvGrpSpPr>
-        <p:cNvPr id="109" name="Shape 109"/>
+        <p:cNvPr id="113" name="Shape 113"/>
         <p:cNvGrpSpPr/>
         <p:nvPr/>
       </p:nvGrpSpPr>
@@ -7869,7 +8986,7 @@
       </p:grpSpPr>
       <p:sp>
         <p:nvSpPr>
-          <p:cNvPr id="110" name="Google Shape;110;p21"/>
+          <p:cNvPr id="114" name="Google Shape;114;p21"/>
           <p:cNvSpPr txBox="1"/>
           <p:nvPr>
             <p:ph type="title"/>
@@ -7909,7 +9026,7 @@
       </p:sp>
       <p:pic>
         <p:nvPicPr>
-          <p:cNvPr id="111" name="Google Shape;111;p21"/>
+          <p:cNvPr id="115" name="Google Shape;115;p21"/>
           <p:cNvPicPr preferRelativeResize="0"/>
           <p:nvPr/>
         </p:nvPicPr>
@@ -7936,7 +9053,7 @@
       </p:pic>
       <p:pic>
         <p:nvPicPr>
-          <p:cNvPr id="112" name="Google Shape;112;p21"/>
+          <p:cNvPr id="116" name="Google Shape;116;p21"/>
           <p:cNvPicPr preferRelativeResize="0"/>
           <p:nvPr/>
         </p:nvPicPr>
@@ -7964,7 +9081,7 @@
       </p:pic>
       <p:pic>
         <p:nvPicPr>
-          <p:cNvPr id="113" name="Google Shape;113;p21"/>
+          <p:cNvPr id="117" name="Google Shape;117;p21"/>
           <p:cNvPicPr preferRelativeResize="0"/>
           <p:nvPr/>
         </p:nvPicPr>
@@ -7992,7 +9109,7 @@
       </p:pic>
       <p:cxnSp>
         <p:nvCxnSpPr>
-          <p:cNvPr id="114" name="Google Shape;114;p21"/>
+          <p:cNvPr id="118" name="Google Shape;118;p21"/>
           <p:cNvCxnSpPr/>
           <p:nvPr/>
         </p:nvCxnSpPr>
@@ -8016,6 +9133,81 @@
           </a:ln>
         </p:spPr>
       </p:cxnSp>
+      <p:sp>
+        <p:nvSpPr>
+          <p:cNvPr id="119" name="Google Shape;119;p21"/>
+          <p:cNvSpPr txBox="1"/>
+          <p:nvPr/>
+        </p:nvSpPr>
+        <p:spPr>
+          <a:xfrm>
+            <a:off x="4723800" y="502375"/>
+            <a:ext cx="4108500" cy="692700"/>
+          </a:xfrm>
+          <a:prstGeom prst="rect">
+            <a:avLst/>
+          </a:prstGeom>
+          <a:noFill/>
+          <a:ln>
+            <a:noFill/>
+          </a:ln>
+        </p:spPr>
+        <p:txBody>
+          <a:bodyPr anchorCtr="0" anchor="t" bIns="91425" lIns="91425" spcFirstLastPara="1" rIns="91425" wrap="square" tIns="91425">
+            <a:spAutoFit/>
+          </a:bodyPr>
+          <a:lstStyle/>
+          <a:p>
+            <a:pPr indent="0" lvl="0" marL="0" rtl="0" algn="l">
+              <a:spcBef>
+                <a:spcPts val="0"/>
+              </a:spcBef>
+              <a:spcAft>
+                <a:spcPts val="0"/>
+              </a:spcAft>
+              <a:buNone/>
+            </a:pPr>
+            <a:r>
+              <a:rPr lang="en" sz="1100">
+                <a:solidFill>
+                  <a:srgbClr val="666666"/>
+                </a:solidFill>
+                <a:highlight>
+                  <a:srgbClr val="FFFFFF"/>
+                </a:highlight>
+              </a:rPr>
+              <a:t>Foster, Dylan, and Alexander Rakhlin. "Beyond ucb: Optimal and efficient contextual bandits with regression oracles." </a:t>
+            </a:r>
+            <a:r>
+              <a:rPr i="1" lang="en" sz="1100">
+                <a:solidFill>
+                  <a:srgbClr val="666666"/>
+                </a:solidFill>
+                <a:highlight>
+                  <a:srgbClr val="FFFFFF"/>
+                </a:highlight>
+              </a:rPr>
+              <a:t>International Conference on Machine Learning</a:t>
+            </a:r>
+            <a:r>
+              <a:rPr lang="en" sz="1100">
+                <a:solidFill>
+                  <a:srgbClr val="666666"/>
+                </a:solidFill>
+                <a:highlight>
+                  <a:srgbClr val="FFFFFF"/>
+                </a:highlight>
+              </a:rPr>
+              <a:t>. PMLR, 2020.</a:t>
+            </a:r>
+            <a:endParaRPr sz="1200">
+              <a:solidFill>
+                <a:srgbClr val="666666"/>
+              </a:solidFill>
+            </a:endParaRPr>
+          </a:p>
+        </p:txBody>
+      </p:sp>
     </p:spTree>
   </p:cSld>
   <p:clrMapOvr>

</xml_diff>